<commit_message>
*Share file *Daily scrum *Presentation
</commit_message>
<xml_diff>
--- a/PHP-Presentation.pptx
+++ b/PHP-Presentation.pptx
@@ -11,11 +11,8 @@
     <p:sldId id="259" r:id="rId5"/>
     <p:sldId id="260" r:id="rId6"/>
     <p:sldId id="261" r:id="rId7"/>
-    <p:sldId id="262" r:id="rId8"/>
-    <p:sldId id="263" r:id="rId9"/>
-    <p:sldId id="264" r:id="rId10"/>
-    <p:sldId id="267" r:id="rId11"/>
-    <p:sldId id="265" r:id="rId12"/>
+    <p:sldId id="264" r:id="rId8"/>
+    <p:sldId id="265" r:id="rId9"/>
   </p:sldIdLst>
   <p:sldSz cx="12192000" cy="6858000"/>
   <p:notesSz cx="6858000" cy="9144000"/>
@@ -322,7 +319,7 @@
             <a:fld id="{930D3CF7-49A3-40F1-BD80-236EF29BEA74}" type="datetimeFigureOut">
               <a:rPr lang="en-US" smtClean="0"/>
               <a:pPr/>
-              <a:t>11/15/2017</a:t>
+              <a:t>11/18/2017</a:t>
             </a:fld>
             <a:endParaRPr lang="en-US"/>
           </a:p>
@@ -662,7 +659,7 @@
             <a:fld id="{930D3CF7-49A3-40F1-BD80-236EF29BEA74}" type="datetimeFigureOut">
               <a:rPr lang="en-US" smtClean="0"/>
               <a:pPr/>
-              <a:t>11/15/2017</a:t>
+              <a:t>11/18/2017</a:t>
             </a:fld>
             <a:endParaRPr lang="en-US"/>
           </a:p>
@@ -1065,7 +1062,7 @@
             <a:fld id="{930D3CF7-49A3-40F1-BD80-236EF29BEA74}" type="datetimeFigureOut">
               <a:rPr lang="en-US" smtClean="0"/>
               <a:pPr/>
-              <a:t>11/15/2017</a:t>
+              <a:t>11/18/2017</a:t>
             </a:fld>
             <a:endParaRPr lang="en-US"/>
           </a:p>
@@ -1403,7 +1400,7 @@
             <a:fld id="{930D3CF7-49A3-40F1-BD80-236EF29BEA74}" type="datetimeFigureOut">
               <a:rPr lang="en-US" smtClean="0"/>
               <a:pPr/>
-              <a:t>11/15/2017</a:t>
+              <a:t>11/18/2017</a:t>
             </a:fld>
             <a:endParaRPr lang="en-US"/>
           </a:p>
@@ -1725,7 +1722,7 @@
             <a:fld id="{930D3CF7-49A3-40F1-BD80-236EF29BEA74}" type="datetimeFigureOut">
               <a:rPr lang="en-US" smtClean="0"/>
               <a:pPr/>
-              <a:t>11/15/2017</a:t>
+              <a:t>11/18/2017</a:t>
             </a:fld>
             <a:endParaRPr lang="en-US"/>
           </a:p>
@@ -2123,7 +2120,7 @@
             <a:fld id="{930D3CF7-49A3-40F1-BD80-236EF29BEA74}" type="datetimeFigureOut">
               <a:rPr lang="en-US" smtClean="0"/>
               <a:pPr/>
-              <a:t>11/15/2017</a:t>
+              <a:t>11/18/2017</a:t>
             </a:fld>
             <a:endParaRPr lang="en-US"/>
           </a:p>
@@ -2382,7 +2379,7 @@
             <a:fld id="{930D3CF7-49A3-40F1-BD80-236EF29BEA74}" type="datetimeFigureOut">
               <a:rPr lang="en-US" smtClean="0"/>
               <a:pPr/>
-              <a:t>11/15/2017</a:t>
+              <a:t>11/18/2017</a:t>
             </a:fld>
             <a:endParaRPr lang="en-US"/>
           </a:p>
@@ -2646,7 +2643,7 @@
             <a:fld id="{930D3CF7-49A3-40F1-BD80-236EF29BEA74}" type="datetimeFigureOut">
               <a:rPr lang="en-US" smtClean="0"/>
               <a:pPr/>
-              <a:t>11/15/2017</a:t>
+              <a:t>11/18/2017</a:t>
             </a:fld>
             <a:endParaRPr lang="en-US"/>
           </a:p>
@@ -2910,7 +2907,7 @@
             <a:fld id="{930D3CF7-49A3-40F1-BD80-236EF29BEA74}" type="datetimeFigureOut">
               <a:rPr lang="en-US" smtClean="0"/>
               <a:pPr/>
-              <a:t>11/15/2017</a:t>
+              <a:t>11/18/2017</a:t>
             </a:fld>
             <a:endParaRPr lang="en-US"/>
           </a:p>
@@ -3241,7 +3238,7 @@
             <a:fld id="{930D3CF7-49A3-40F1-BD80-236EF29BEA74}" type="datetimeFigureOut">
               <a:rPr lang="en-US" smtClean="0"/>
               <a:pPr/>
-              <a:t>11/15/2017</a:t>
+              <a:t>11/18/2017</a:t>
             </a:fld>
             <a:endParaRPr lang="en-US"/>
           </a:p>
@@ -3566,7 +3563,7 @@
             <a:fld id="{930D3CF7-49A3-40F1-BD80-236EF29BEA74}" type="datetimeFigureOut">
               <a:rPr lang="en-US" smtClean="0"/>
               <a:pPr/>
-              <a:t>11/15/2017</a:t>
+              <a:t>11/18/2017</a:t>
             </a:fld>
             <a:endParaRPr lang="en-US"/>
           </a:p>
@@ -4025,7 +4022,7 @@
             <a:fld id="{930D3CF7-49A3-40F1-BD80-236EF29BEA74}" type="datetimeFigureOut">
               <a:rPr lang="en-US" smtClean="0"/>
               <a:pPr/>
-              <a:t>11/15/2017</a:t>
+              <a:t>11/18/2017</a:t>
             </a:fld>
             <a:endParaRPr lang="en-US"/>
           </a:p>
@@ -4232,7 +4229,7 @@
             <a:fld id="{930D3CF7-49A3-40F1-BD80-236EF29BEA74}" type="datetimeFigureOut">
               <a:rPr lang="en-US" smtClean="0"/>
               <a:pPr/>
-              <a:t>11/15/2017</a:t>
+              <a:t>11/18/2017</a:t>
             </a:fld>
             <a:endParaRPr lang="en-US"/>
           </a:p>
@@ -4411,7 +4408,7 @@
             <a:fld id="{930D3CF7-49A3-40F1-BD80-236EF29BEA74}" type="datetimeFigureOut">
               <a:rPr lang="en-US" smtClean="0"/>
               <a:pPr/>
-              <a:t>11/15/2017</a:t>
+              <a:t>11/18/2017</a:t>
             </a:fld>
             <a:endParaRPr lang="en-US"/>
           </a:p>
@@ -4746,7 +4743,7 @@
             <a:fld id="{930D3CF7-49A3-40F1-BD80-236EF29BEA74}" type="datetimeFigureOut">
               <a:rPr lang="en-US" smtClean="0"/>
               <a:pPr/>
-              <a:t>11/15/2017</a:t>
+              <a:t>11/18/2017</a:t>
             </a:fld>
             <a:endParaRPr lang="en-US"/>
           </a:p>
@@ -5093,7 +5090,7 @@
             <a:fld id="{930D3CF7-49A3-40F1-BD80-236EF29BEA74}" type="datetimeFigureOut">
               <a:rPr lang="en-US" smtClean="0"/>
               <a:pPr/>
-              <a:t>11/15/2017</a:t>
+              <a:t>11/18/2017</a:t>
             </a:fld>
             <a:endParaRPr lang="en-US"/>
           </a:p>
@@ -7212,7 +7209,7 @@
             <a:fld id="{930D3CF7-49A3-40F1-BD80-236EF29BEA74}" type="datetimeFigureOut">
               <a:rPr lang="en-US" smtClean="0"/>
               <a:pPr/>
-              <a:t>11/15/2017</a:t>
+              <a:t>11/18/2017</a:t>
             </a:fld>
             <a:endParaRPr lang="en-US"/>
           </a:p>
@@ -7943,176 +7940,6 @@
 </p:sld>
 </file>
 
-<file path=ppt/slides/slide10.xml><?xml version="1.0" encoding="utf-8"?>
-<p:sld xmlns:a="http://schemas.openxmlformats.org/drawingml/2006/main" xmlns:r="http://schemas.openxmlformats.org/officeDocument/2006/relationships" xmlns:p="http://schemas.openxmlformats.org/presentationml/2006/main">
-  <p:cSld>
-    <p:spTree>
-      <p:nvGrpSpPr>
-        <p:cNvPr id="1" name=""/>
-        <p:cNvGrpSpPr/>
-        <p:nvPr/>
-      </p:nvGrpSpPr>
-      <p:grpSpPr>
-        <a:xfrm>
-          <a:off x="0" y="0"/>
-          <a:ext cx="0" cy="0"/>
-          <a:chOff x="0" y="0"/>
-          <a:chExt cx="0" cy="0"/>
-        </a:xfrm>
-      </p:grpSpPr>
-      <p:sp>
-        <p:nvSpPr>
-          <p:cNvPr id="2" name="Title 1"/>
-          <p:cNvSpPr>
-            <a:spLocks noGrp="1"/>
-          </p:cNvSpPr>
-          <p:nvPr>
-            <p:ph type="title"/>
-          </p:nvPr>
-        </p:nvSpPr>
-        <p:spPr/>
-        <p:txBody>
-          <a:bodyPr/>
-          <a:lstStyle/>
-          <a:p>
-            <a:r>
-              <a:rPr lang="en-CA" dirty="0" err="1" smtClean="0"/>
-              <a:t>Refrences</a:t>
-            </a:r>
-            <a:endParaRPr lang="en-CA" dirty="0"/>
-          </a:p>
-        </p:txBody>
-      </p:sp>
-      <p:sp>
-        <p:nvSpPr>
-          <p:cNvPr id="3" name="Content Placeholder 2"/>
-          <p:cNvSpPr>
-            <a:spLocks noGrp="1"/>
-          </p:cNvSpPr>
-          <p:nvPr>
-            <p:ph idx="1"/>
-          </p:nvPr>
-        </p:nvSpPr>
-        <p:spPr/>
-        <p:txBody>
-          <a:bodyPr/>
-          <a:lstStyle/>
-          <a:p>
-            <a:r>
-              <a:rPr lang="en-CA" dirty="0">
-                <a:hlinkClick r:id="rId2"/>
-              </a:rPr>
-              <a:t>https://docs.slimframework.com</a:t>
-            </a:r>
-            <a:r>
-              <a:rPr lang="en-CA" dirty="0" smtClean="0">
-                <a:hlinkClick r:id="rId2"/>
-              </a:rPr>
-              <a:t>/</a:t>
-            </a:r>
-            <a:endParaRPr lang="en-CA" dirty="0" smtClean="0"/>
-          </a:p>
-          <a:p>
-            <a:endParaRPr lang="en-CA" dirty="0"/>
-          </a:p>
-        </p:txBody>
-      </p:sp>
-    </p:spTree>
-    <p:extLst>
-      <p:ext uri="{BB962C8B-B14F-4D97-AF65-F5344CB8AC3E}">
-        <p14:creationId xmlns:p14="http://schemas.microsoft.com/office/powerpoint/2010/main" val="4112446509"/>
-      </p:ext>
-    </p:extLst>
-  </p:cSld>
-  <p:clrMapOvr>
-    <a:masterClrMapping/>
-  </p:clrMapOvr>
-</p:sld>
-</file>
-
-<file path=ppt/slides/slide11.xml><?xml version="1.0" encoding="utf-8"?>
-<p:sld xmlns:a="http://schemas.openxmlformats.org/drawingml/2006/main" xmlns:r="http://schemas.openxmlformats.org/officeDocument/2006/relationships" xmlns:p="http://schemas.openxmlformats.org/presentationml/2006/main">
-  <p:cSld>
-    <p:spTree>
-      <p:nvGrpSpPr>
-        <p:cNvPr id="1" name=""/>
-        <p:cNvGrpSpPr/>
-        <p:nvPr/>
-      </p:nvGrpSpPr>
-      <p:grpSpPr>
-        <a:xfrm>
-          <a:off x="0" y="0"/>
-          <a:ext cx="0" cy="0"/>
-          <a:chOff x="0" y="0"/>
-          <a:chExt cx="0" cy="0"/>
-        </a:xfrm>
-      </p:grpSpPr>
-      <p:sp>
-        <p:nvSpPr>
-          <p:cNvPr id="2" name="Title 1"/>
-          <p:cNvSpPr>
-            <a:spLocks noGrp="1"/>
-          </p:cNvSpPr>
-          <p:nvPr>
-            <p:ph type="title"/>
-          </p:nvPr>
-        </p:nvSpPr>
-        <p:spPr/>
-        <p:txBody>
-          <a:bodyPr/>
-          <a:lstStyle/>
-          <a:p>
-            <a:pPr algn="ctr"/>
-            <a:r>
-              <a:rPr lang="en-US" b="1" dirty="0" smtClean="0"/>
-              <a:t>Thanks</a:t>
-            </a:r>
-            <a:endParaRPr lang="en-US" b="1" dirty="0"/>
-          </a:p>
-        </p:txBody>
-      </p:sp>
-      <p:pic>
-        <p:nvPicPr>
-          <p:cNvPr id="4" name="Content Placeholder 3"/>
-          <p:cNvPicPr>
-            <a:picLocks noGrp="1" noChangeAspect="1"/>
-          </p:cNvPicPr>
-          <p:nvPr>
-            <p:ph idx="1"/>
-          </p:nvPr>
-        </p:nvPicPr>
-        <p:blipFill>
-          <a:blip r:embed="rId2" cstate="print">
-            <a:extLst>
-              <a:ext uri="{28A0092B-C50C-407E-A947-70E740481C1C}">
-                <a14:useLocalDpi xmlns:a14="http://schemas.microsoft.com/office/drawing/2010/main" val="0"/>
-              </a:ext>
-            </a:extLst>
-          </a:blip>
-          <a:stretch>
-            <a:fillRect/>
-          </a:stretch>
-        </p:blipFill>
-        <p:spPr>
-          <a:xfrm>
-            <a:off x="4246323" y="2593975"/>
-            <a:ext cx="4108537" cy="2857500"/>
-          </a:xfrm>
-        </p:spPr>
-      </p:pic>
-    </p:spTree>
-    <p:extLst>
-      <p:ext uri="{BB962C8B-B14F-4D97-AF65-F5344CB8AC3E}">
-        <p14:creationId xmlns:p14="http://schemas.microsoft.com/office/powerpoint/2010/main" val="2784108446"/>
-      </p:ext>
-    </p:extLst>
-  </p:cSld>
-  <p:clrMapOvr>
-    <a:masterClrMapping/>
-  </p:clrMapOvr>
-</p:sld>
-</file>
-
 <file path=ppt/slides/slide2.xml><?xml version="1.0" encoding="utf-8"?>
 <p:sld xmlns:a="http://schemas.openxmlformats.org/drawingml/2006/main" xmlns:r="http://schemas.openxmlformats.org/officeDocument/2006/relationships" xmlns:p="http://schemas.openxmlformats.org/presentationml/2006/main">
   <p:cSld>
@@ -8294,32 +8121,25 @@
           </a:p>
         </p:txBody>
       </p:sp>
-      <p:pic>
-        <p:nvPicPr>
-          <p:cNvPr id="5" name="Content Placeholder 3"/>
-          <p:cNvPicPr>
-            <a:picLocks noGrp="1" noChangeAspect="1"/>
-          </p:cNvPicPr>
+      <p:sp>
+        <p:nvSpPr>
+          <p:cNvPr id="3" name="Content Placeholder 2"/>
+          <p:cNvSpPr>
+            <a:spLocks noGrp="1"/>
+          </p:cNvSpPr>
           <p:nvPr>
             <p:ph idx="1"/>
           </p:nvPr>
-        </p:nvPicPr>
-        <p:blipFill>
-          <a:blip r:embed="rId2"/>
-          <a:stretch>
-            <a:fillRect/>
-          </a:stretch>
-        </p:blipFill>
-        <p:spPr>
-          <a:xfrm>
-            <a:off x="2518525" y="1529542"/>
-            <a:ext cx="2784995" cy="1504603"/>
-          </a:xfrm>
-          <a:prstGeom prst="rect">
-            <a:avLst/>
-          </a:prstGeom>
-        </p:spPr>
-      </p:pic>
+        </p:nvSpPr>
+        <p:spPr/>
+        <p:txBody>
+          <a:bodyPr/>
+          <a:lstStyle/>
+          <a:p>
+            <a:endParaRPr lang="en-CA" dirty="0"/>
+          </a:p>
+        </p:txBody>
+      </p:sp>
     </p:spTree>
   </p:cSld>
   <p:clrMapOvr>
@@ -8355,7 +8175,12 @@
             <p:ph type="title"/>
           </p:nvPr>
         </p:nvSpPr>
-        <p:spPr/>
+        <p:spPr>
+          <a:xfrm>
+            <a:off x="2592925" y="624110"/>
+            <a:ext cx="7234247" cy="1120607"/>
+          </a:xfrm>
+        </p:spPr>
         <p:txBody>
           <a:bodyPr/>
           <a:lstStyle/>
@@ -8370,7 +8195,7 @@
       </p:sp>
       <p:pic>
         <p:nvPicPr>
-          <p:cNvPr id="5" name="Picture 4"/>
+          <p:cNvPr id="3" name="Picture 2"/>
           <p:cNvPicPr>
             <a:picLocks noChangeAspect="1"/>
           </p:cNvPicPr>
@@ -8384,8 +8209,8 @@
         </p:blipFill>
         <p:spPr>
           <a:xfrm>
-            <a:off x="2302625" y="1726456"/>
-            <a:ext cx="8059103" cy="5131544"/>
+            <a:off x="2113587" y="1524000"/>
+            <a:ext cx="8522881" cy="5133811"/>
           </a:xfrm>
           <a:prstGeom prst="rect">
             <a:avLst/>
@@ -8432,9 +8257,16 @@
             <p:ph type="title"/>
           </p:nvPr>
         </p:nvSpPr>
-        <p:spPr/>
-        <p:txBody>
-          <a:bodyPr/>
+        <p:spPr>
+          <a:xfrm>
+            <a:off x="427795" y="124811"/>
+            <a:ext cx="2840922" cy="742235"/>
+          </a:xfrm>
+        </p:spPr>
+        <p:txBody>
+          <a:bodyPr>
+            <a:normAutofit/>
+          </a:bodyPr>
           <a:lstStyle/>
           <a:p>
             <a:r>
@@ -8447,7 +8279,7 @@
       </p:sp>
       <p:pic>
         <p:nvPicPr>
-          <p:cNvPr id="6" name="Content Placeholder 5"/>
+          <p:cNvPr id="5" name="Content Placeholder 4"/>
           <p:cNvPicPr>
             <a:picLocks noGrp="1" noChangeAspect="1"/>
           </p:cNvPicPr>
@@ -8463,8 +8295,8 @@
         </p:blipFill>
         <p:spPr>
           <a:xfrm>
-            <a:off x="5682833" y="2612023"/>
-            <a:ext cx="5136427" cy="2538383"/>
+            <a:off x="4555450" y="358982"/>
+            <a:ext cx="7387975" cy="3233873"/>
           </a:xfrm>
           <a:prstGeom prst="rect">
             <a:avLst/>
@@ -8473,7 +8305,7 @@
       </p:pic>
       <p:pic>
         <p:nvPicPr>
-          <p:cNvPr id="7" name="Picture 6"/>
+          <p:cNvPr id="4" name="Picture 3"/>
           <p:cNvPicPr>
             <a:picLocks noChangeAspect="1"/>
           </p:cNvPicPr>
@@ -8487,50 +8319,17 @@
         </p:blipFill>
         <p:spPr>
           <a:xfrm>
-            <a:off x="1442431" y="1905000"/>
-            <a:ext cx="2905125" cy="1581150"/>
+            <a:off x="4975864" y="3752193"/>
+            <a:ext cx="6330462" cy="2669627"/>
           </a:xfrm>
           <a:prstGeom prst="rect">
             <a:avLst/>
           </a:prstGeom>
         </p:spPr>
       </p:pic>
-      <p:cxnSp>
-        <p:nvCxnSpPr>
-          <p:cNvPr id="9" name="Elbow Connector 8"/>
-          <p:cNvCxnSpPr/>
-          <p:nvPr/>
-        </p:nvCxnSpPr>
-        <p:spPr>
-          <a:xfrm>
-            <a:off x="3998422" y="2612023"/>
-            <a:ext cx="1696634" cy="1456862"/>
-          </a:xfrm>
-          <a:prstGeom prst="bentConnector3">
-            <a:avLst/>
-          </a:prstGeom>
-          <a:ln>
-            <a:tailEnd type="triangle"/>
-          </a:ln>
-        </p:spPr>
-        <p:style>
-          <a:lnRef idx="1">
-            <a:schemeClr val="accent1"/>
-          </a:lnRef>
-          <a:fillRef idx="0">
-            <a:schemeClr val="accent1"/>
-          </a:fillRef>
-          <a:effectRef idx="0">
-            <a:schemeClr val="accent1"/>
-          </a:effectRef>
-          <a:fontRef idx="minor">
-            <a:schemeClr val="tx1"/>
-          </a:fontRef>
-        </p:style>
-      </p:cxnSp>
       <p:pic>
         <p:nvPicPr>
-          <p:cNvPr id="15" name="Picture 14"/>
+          <p:cNvPr id="10" name="Picture 9"/>
           <p:cNvPicPr>
             <a:picLocks noChangeAspect="1"/>
           </p:cNvPicPr>
@@ -8544,8 +8343,8 @@
         </p:blipFill>
         <p:spPr>
           <a:xfrm>
-            <a:off x="1656423" y="4256116"/>
-            <a:ext cx="3550375" cy="2108488"/>
+            <a:off x="202525" y="867045"/>
+            <a:ext cx="4400893" cy="1928707"/>
           </a:xfrm>
           <a:prstGeom prst="rect">
             <a:avLst/>
@@ -8592,7 +8391,12 @@
             <p:ph type="title"/>
           </p:nvPr>
         </p:nvSpPr>
-        <p:spPr/>
+        <p:spPr>
+          <a:xfrm>
+            <a:off x="294290" y="0"/>
+            <a:ext cx="2774731" cy="681037"/>
+          </a:xfrm>
+        </p:spPr>
         <p:txBody>
           <a:bodyPr/>
           <a:lstStyle/>
@@ -8607,13 +8411,11 @@
       </p:sp>
       <p:pic>
         <p:nvPicPr>
-          <p:cNvPr id="4" name="Content Placeholder 3"/>
+          <p:cNvPr id="6" name="Picture 5"/>
           <p:cNvPicPr>
-            <a:picLocks noGrp="1" noChangeAspect="1"/>
+            <a:picLocks noChangeAspect="1"/>
           </p:cNvPicPr>
-          <p:nvPr>
-            <p:ph idx="1"/>
-          </p:nvPr>
+          <p:nvPr/>
         </p:nvPicPr>
         <p:blipFill>
           <a:blip r:embed="rId2"/>
@@ -8623,8 +8425,56 @@
         </p:blipFill>
         <p:spPr>
           <a:xfrm>
-            <a:off x="2589213" y="3605159"/>
-            <a:ext cx="8915400" cy="1124496"/>
+            <a:off x="3846786" y="681037"/>
+            <a:ext cx="8345214" cy="2524618"/>
+          </a:xfrm>
+          <a:prstGeom prst="rect">
+            <a:avLst/>
+          </a:prstGeom>
+        </p:spPr>
+      </p:pic>
+      <p:pic>
+        <p:nvPicPr>
+          <p:cNvPr id="7" name="Picture 6"/>
+          <p:cNvPicPr>
+            <a:picLocks noChangeAspect="1"/>
+          </p:cNvPicPr>
+          <p:nvPr/>
+        </p:nvPicPr>
+        <p:blipFill>
+          <a:blip r:embed="rId3"/>
+          <a:stretch>
+            <a:fillRect/>
+          </a:stretch>
+        </p:blipFill>
+        <p:spPr>
+          <a:xfrm>
+            <a:off x="3720333" y="3205655"/>
+            <a:ext cx="8324850" cy="3562350"/>
+          </a:xfrm>
+          <a:prstGeom prst="rect">
+            <a:avLst/>
+          </a:prstGeom>
+        </p:spPr>
+      </p:pic>
+      <p:pic>
+        <p:nvPicPr>
+          <p:cNvPr id="8" name="Picture 7"/>
+          <p:cNvPicPr>
+            <a:picLocks noChangeAspect="1"/>
+          </p:cNvPicPr>
+          <p:nvPr/>
+        </p:nvPicPr>
+        <p:blipFill>
+          <a:blip r:embed="rId4"/>
+          <a:stretch>
+            <a:fillRect/>
+          </a:stretch>
+        </p:blipFill>
+        <p:spPr>
+          <a:xfrm>
+            <a:off x="672662" y="986823"/>
+            <a:ext cx="3426043" cy="5645205"/>
           </a:xfrm>
           <a:prstGeom prst="rect">
             <a:avLst/>
@@ -8678,7 +8528,7 @@
           <a:p>
             <a:r>
               <a:rPr lang="en-US" dirty="0" smtClean="0"/>
-              <a:t>challenges</a:t>
+              <a:t>Futures </a:t>
             </a:r>
             <a:endParaRPr lang="en-US" dirty="0"/>
           </a:p>
@@ -8699,14 +8549,44 @@
           <a:bodyPr/>
           <a:lstStyle/>
           <a:p>
-            <a:endParaRPr lang="en-US"/>
+            <a:r>
+              <a:rPr lang="en-US" sz="2000" b="1" dirty="0" smtClean="0"/>
+              <a:t>Delete in share list</a:t>
+            </a:r>
+            <a:endParaRPr lang="en-US" sz="2000" b="1" dirty="0" smtClean="0"/>
+          </a:p>
+          <a:p>
+            <a:r>
+              <a:rPr lang="en-US" sz="2000" b="1" dirty="0" smtClean="0"/>
+              <a:t>Add some error checking in some parts</a:t>
+            </a:r>
+            <a:endParaRPr lang="en-US" sz="2000" b="1" dirty="0" smtClean="0"/>
+          </a:p>
+          <a:p>
+            <a:r>
+              <a:rPr lang="en-US" b="1" dirty="0" smtClean="0"/>
+              <a:t>Add log in face book</a:t>
+            </a:r>
+            <a:endParaRPr lang="en-US" b="1" dirty="0" smtClean="0"/>
+          </a:p>
+          <a:p>
+            <a:pPr>
+              <a:buNone/>
+            </a:pPr>
+            <a:endParaRPr lang="en-US" dirty="0" smtClean="0"/>
+          </a:p>
+          <a:p>
+            <a:endParaRPr lang="en-US" dirty="0" smtClean="0"/>
+          </a:p>
+          <a:p>
+            <a:endParaRPr lang="en-US" dirty="0"/>
           </a:p>
         </p:txBody>
       </p:sp>
     </p:spTree>
     <p:extLst>
       <p:ext uri="{BB962C8B-B14F-4D97-AF65-F5344CB8AC3E}">
-        <p14:creationId xmlns:p14="http://schemas.microsoft.com/office/powerpoint/2010/main" val="2409900537"/>
+        <p14:creationId xmlns:p14="http://schemas.microsoft.com/office/powerpoint/2010/main" val="272585998"/>
       </p:ext>
     </p:extLst>
   </p:cSld>
@@ -8748,144 +8628,48 @@
           <a:bodyPr/>
           <a:lstStyle/>
           <a:p>
-            <a:r>
-              <a:rPr lang="en-US" dirty="0" smtClean="0"/>
-              <a:t>challenges</a:t>
-            </a:r>
-            <a:endParaRPr lang="en-US" dirty="0"/>
-          </a:p>
-        </p:txBody>
-      </p:sp>
-      <p:sp>
-        <p:nvSpPr>
-          <p:cNvPr id="3" name="Content Placeholder 2"/>
-          <p:cNvSpPr>
-            <a:spLocks noGrp="1"/>
-          </p:cNvSpPr>
+            <a:pPr algn="ctr"/>
+            <a:r>
+              <a:rPr lang="en-US" b="1" dirty="0" smtClean="0"/>
+              <a:t>Thanks</a:t>
+            </a:r>
+            <a:endParaRPr lang="en-US" b="1" dirty="0"/>
+          </a:p>
+        </p:txBody>
+      </p:sp>
+      <p:pic>
+        <p:nvPicPr>
+          <p:cNvPr id="4" name="Content Placeholder 3"/>
+          <p:cNvPicPr>
+            <a:picLocks noGrp="1" noChangeAspect="1"/>
+          </p:cNvPicPr>
           <p:nvPr>
             <p:ph idx="1"/>
           </p:nvPr>
-        </p:nvSpPr>
-        <p:spPr/>
-        <p:txBody>
-          <a:bodyPr/>
-          <a:lstStyle/>
-          <a:p>
-            <a:endParaRPr lang="en-US"/>
-          </a:p>
-        </p:txBody>
-      </p:sp>
+        </p:nvPicPr>
+        <p:blipFill>
+          <a:blip r:embed="rId2" cstate="print">
+            <a:extLst>
+              <a:ext uri="{28A0092B-C50C-407E-A947-70E740481C1C}">
+                <a14:useLocalDpi xmlns:a14="http://schemas.microsoft.com/office/drawing/2010/main" val="0"/>
+              </a:ext>
+            </a:extLst>
+          </a:blip>
+          <a:stretch>
+            <a:fillRect/>
+          </a:stretch>
+        </p:blipFill>
+        <p:spPr>
+          <a:xfrm>
+            <a:off x="4246323" y="2593975"/>
+            <a:ext cx="4108537" cy="2857500"/>
+          </a:xfrm>
+        </p:spPr>
+      </p:pic>
     </p:spTree>
     <p:extLst>
       <p:ext uri="{BB962C8B-B14F-4D97-AF65-F5344CB8AC3E}">
-        <p14:creationId xmlns:p14="http://schemas.microsoft.com/office/powerpoint/2010/main" val="978202197"/>
-      </p:ext>
-    </p:extLst>
-  </p:cSld>
-  <p:clrMapOvr>
-    <a:masterClrMapping/>
-  </p:clrMapOvr>
-</p:sld>
-</file>
-
-<file path=ppt/slides/slide9.xml><?xml version="1.0" encoding="utf-8"?>
-<p:sld xmlns:a="http://schemas.openxmlformats.org/drawingml/2006/main" xmlns:r="http://schemas.openxmlformats.org/officeDocument/2006/relationships" xmlns:p="http://schemas.openxmlformats.org/presentationml/2006/main">
-  <p:cSld>
-    <p:spTree>
-      <p:nvGrpSpPr>
-        <p:cNvPr id="1" name=""/>
-        <p:cNvGrpSpPr/>
-        <p:nvPr/>
-      </p:nvGrpSpPr>
-      <p:grpSpPr>
-        <a:xfrm>
-          <a:off x="0" y="0"/>
-          <a:ext cx="0" cy="0"/>
-          <a:chOff x="0" y="0"/>
-          <a:chExt cx="0" cy="0"/>
-        </a:xfrm>
-      </p:grpSpPr>
-      <p:sp>
-        <p:nvSpPr>
-          <p:cNvPr id="2" name="Title 1"/>
-          <p:cNvSpPr>
-            <a:spLocks noGrp="1"/>
-          </p:cNvSpPr>
-          <p:nvPr>
-            <p:ph type="title"/>
-          </p:nvPr>
-        </p:nvSpPr>
-        <p:spPr/>
-        <p:txBody>
-          <a:bodyPr/>
-          <a:lstStyle/>
-          <a:p>
-            <a:r>
-              <a:rPr lang="en-US" dirty="0" smtClean="0"/>
-              <a:t>Futures </a:t>
-            </a:r>
-            <a:endParaRPr lang="en-US" dirty="0"/>
-          </a:p>
-        </p:txBody>
-      </p:sp>
-      <p:sp>
-        <p:nvSpPr>
-          <p:cNvPr id="3" name="Content Placeholder 2"/>
-          <p:cNvSpPr>
-            <a:spLocks noGrp="1"/>
-          </p:cNvSpPr>
-          <p:nvPr>
-            <p:ph idx="1"/>
-          </p:nvPr>
-        </p:nvSpPr>
-        <p:spPr/>
-        <p:txBody>
-          <a:bodyPr/>
-          <a:lstStyle/>
-          <a:p>
-            <a:r>
-              <a:rPr lang="en-US" sz="2000" b="1" dirty="0" smtClean="0"/>
-              <a:t>Clock Time for Employee</a:t>
-            </a:r>
-          </a:p>
-          <a:p>
-            <a:r>
-              <a:rPr lang="en-US" sz="2000" b="1" dirty="0" smtClean="0"/>
-              <a:t>Table Management</a:t>
-            </a:r>
-          </a:p>
-          <a:p>
-            <a:r>
-              <a:rPr lang="en-US" b="1" dirty="0" smtClean="0"/>
-              <a:t>Add seat number in Order(so we can split bill by </a:t>
-            </a:r>
-            <a:r>
-              <a:rPr lang="en-US" b="1" dirty="0" err="1" smtClean="0"/>
-              <a:t>saatnumber</a:t>
-            </a:r>
-            <a:r>
-              <a:rPr lang="en-US" b="1" dirty="0" smtClean="0"/>
-              <a:t>)</a:t>
-            </a:r>
-          </a:p>
-          <a:p>
-            <a:pPr>
-              <a:buNone/>
-            </a:pPr>
-            <a:endParaRPr lang="en-US" dirty="0" smtClean="0"/>
-          </a:p>
-          <a:p>
-            <a:endParaRPr lang="en-US" dirty="0" smtClean="0"/>
-          </a:p>
-          <a:p>
-            <a:endParaRPr lang="en-US" dirty="0"/>
-          </a:p>
-        </p:txBody>
-      </p:sp>
-    </p:spTree>
-    <p:extLst>
-      <p:ext uri="{BB962C8B-B14F-4D97-AF65-F5344CB8AC3E}">
-        <p14:creationId xmlns:p14="http://schemas.microsoft.com/office/powerpoint/2010/main" val="272585998"/>
+        <p14:creationId xmlns:p14="http://schemas.microsoft.com/office/powerpoint/2010/main" val="2784108446"/>
       </p:ext>
     </p:extLst>
   </p:cSld>

</xml_diff>